<commit_message>
Correction image with redis
</commit_message>
<xml_diff>
--- a/schema/StationDemoWeb.pptx
+++ b/schema/StationDemoWeb.pptx
@@ -259,7 +259,7 @@
           <a:p>
             <a:fld id="{E1876A2D-46C1-4AE6-A94C-6C3E93FB1CE4}" type="datetimeFigureOut">
               <a:rPr lang="fr-FR" smtClean="0"/>
-              <a:t>02/01/2020</a:t>
+              <a:t>25/01/2021</a:t>
             </a:fld>
             <a:endParaRPr lang="fr-FR"/>
           </a:p>
@@ -457,7 +457,7 @@
           <a:p>
             <a:fld id="{E1876A2D-46C1-4AE6-A94C-6C3E93FB1CE4}" type="datetimeFigureOut">
               <a:rPr lang="fr-FR" smtClean="0"/>
-              <a:t>02/01/2020</a:t>
+              <a:t>25/01/2021</a:t>
             </a:fld>
             <a:endParaRPr lang="fr-FR"/>
           </a:p>
@@ -665,7 +665,7 @@
           <a:p>
             <a:fld id="{E1876A2D-46C1-4AE6-A94C-6C3E93FB1CE4}" type="datetimeFigureOut">
               <a:rPr lang="fr-FR" smtClean="0"/>
-              <a:t>02/01/2020</a:t>
+              <a:t>25/01/2021</a:t>
             </a:fld>
             <a:endParaRPr lang="fr-FR"/>
           </a:p>
@@ -863,7 +863,7 @@
           <a:p>
             <a:fld id="{E1876A2D-46C1-4AE6-A94C-6C3E93FB1CE4}" type="datetimeFigureOut">
               <a:rPr lang="fr-FR" smtClean="0"/>
-              <a:t>02/01/2020</a:t>
+              <a:t>25/01/2021</a:t>
             </a:fld>
             <a:endParaRPr lang="fr-FR"/>
           </a:p>
@@ -1138,7 +1138,7 @@
           <a:p>
             <a:fld id="{E1876A2D-46C1-4AE6-A94C-6C3E93FB1CE4}" type="datetimeFigureOut">
               <a:rPr lang="fr-FR" smtClean="0"/>
-              <a:t>02/01/2020</a:t>
+              <a:t>25/01/2021</a:t>
             </a:fld>
             <a:endParaRPr lang="fr-FR"/>
           </a:p>
@@ -1403,7 +1403,7 @@
           <a:p>
             <a:fld id="{E1876A2D-46C1-4AE6-A94C-6C3E93FB1CE4}" type="datetimeFigureOut">
               <a:rPr lang="fr-FR" smtClean="0"/>
-              <a:t>02/01/2020</a:t>
+              <a:t>25/01/2021</a:t>
             </a:fld>
             <a:endParaRPr lang="fr-FR"/>
           </a:p>
@@ -1815,7 +1815,7 @@
           <a:p>
             <a:fld id="{E1876A2D-46C1-4AE6-A94C-6C3E93FB1CE4}" type="datetimeFigureOut">
               <a:rPr lang="fr-FR" smtClean="0"/>
-              <a:t>02/01/2020</a:t>
+              <a:t>25/01/2021</a:t>
             </a:fld>
             <a:endParaRPr lang="fr-FR"/>
           </a:p>
@@ -1956,7 +1956,7 @@
           <a:p>
             <a:fld id="{E1876A2D-46C1-4AE6-A94C-6C3E93FB1CE4}" type="datetimeFigureOut">
               <a:rPr lang="fr-FR" smtClean="0"/>
-              <a:t>02/01/2020</a:t>
+              <a:t>25/01/2021</a:t>
             </a:fld>
             <a:endParaRPr lang="fr-FR"/>
           </a:p>
@@ -2069,7 +2069,7 @@
           <a:p>
             <a:fld id="{E1876A2D-46C1-4AE6-A94C-6C3E93FB1CE4}" type="datetimeFigureOut">
               <a:rPr lang="fr-FR" smtClean="0"/>
-              <a:t>02/01/2020</a:t>
+              <a:t>25/01/2021</a:t>
             </a:fld>
             <a:endParaRPr lang="fr-FR"/>
           </a:p>
@@ -2380,7 +2380,7 @@
           <a:p>
             <a:fld id="{E1876A2D-46C1-4AE6-A94C-6C3E93FB1CE4}" type="datetimeFigureOut">
               <a:rPr lang="fr-FR" smtClean="0"/>
-              <a:t>02/01/2020</a:t>
+              <a:t>25/01/2021</a:t>
             </a:fld>
             <a:endParaRPr lang="fr-FR"/>
           </a:p>
@@ -2668,7 +2668,7 @@
           <a:p>
             <a:fld id="{E1876A2D-46C1-4AE6-A94C-6C3E93FB1CE4}" type="datetimeFigureOut">
               <a:rPr lang="fr-FR" smtClean="0"/>
-              <a:t>02/01/2020</a:t>
+              <a:t>25/01/2021</a:t>
             </a:fld>
             <a:endParaRPr lang="fr-FR"/>
           </a:p>
@@ -2909,7 +2909,7 @@
           <a:p>
             <a:fld id="{E1876A2D-46C1-4AE6-A94C-6C3E93FB1CE4}" type="datetimeFigureOut">
               <a:rPr lang="fr-FR" smtClean="0"/>
-              <a:t>02/01/2020</a:t>
+              <a:t>25/01/2021</a:t>
             </a:fld>
             <a:endParaRPr lang="fr-FR"/>
           </a:p>
@@ -4450,6 +4450,105 @@
           </a:p>
         </p:txBody>
       </p:sp>
+      <p:sp>
+        <p:nvSpPr>
+          <p:cNvPr id="27" name="Rectangle 26">
+            <a:extLst>
+              <a:ext uri="{FF2B5EF4-FFF2-40B4-BE49-F238E27FC236}">
+                <a16:creationId xmlns:a16="http://schemas.microsoft.com/office/drawing/2014/main" id="{B2D1AFA3-69ED-43BC-A150-FAAC545D2369}"/>
+              </a:ext>
+            </a:extLst>
+          </p:cNvPr>
+          <p:cNvSpPr/>
+          <p:nvPr/>
+        </p:nvSpPr>
+        <p:spPr>
+          <a:xfrm>
+            <a:off x="10380170" y="1977600"/>
+            <a:ext cx="1132621" cy="786025"/>
+          </a:xfrm>
+          <a:prstGeom prst="rect">
+            <a:avLst/>
+          </a:prstGeom>
+          <a:solidFill>
+            <a:srgbClr val="00B0F0"/>
+          </a:solidFill>
+          <a:ln>
+            <a:solidFill>
+              <a:schemeClr val="accent6">
+                <a:lumMod val="60000"/>
+                <a:lumOff val="40000"/>
+              </a:schemeClr>
+            </a:solidFill>
+          </a:ln>
+        </p:spPr>
+        <p:style>
+          <a:lnRef idx="2">
+            <a:schemeClr val="accent1">
+              <a:shade val="50000"/>
+            </a:schemeClr>
+          </a:lnRef>
+          <a:fillRef idx="1">
+            <a:schemeClr val="accent1"/>
+          </a:fillRef>
+          <a:effectRef idx="0">
+            <a:schemeClr val="accent1"/>
+          </a:effectRef>
+          <a:fontRef idx="minor">
+            <a:schemeClr val="lt1"/>
+          </a:fontRef>
+        </p:style>
+        <p:txBody>
+          <a:bodyPr rtlCol="0" anchor="ctr"/>
+          <a:lstStyle/>
+          <a:p>
+            <a:pPr algn="ctr"/>
+            <a:r>
+              <a:rPr lang="fr-FR" sz="1600" dirty="0"/>
+              <a:t>Redis</a:t>
+            </a:r>
+          </a:p>
+        </p:txBody>
+      </p:sp>
+      <p:cxnSp>
+        <p:nvCxnSpPr>
+          <p:cNvPr id="4" name="Connecteur droit avec flèche 3">
+            <a:extLst>
+              <a:ext uri="{FF2B5EF4-FFF2-40B4-BE49-F238E27FC236}">
+                <a16:creationId xmlns:a16="http://schemas.microsoft.com/office/drawing/2014/main" id="{9219EBA4-BEA0-4F35-8784-C3ADC73B292A}"/>
+              </a:ext>
+            </a:extLst>
+          </p:cNvPr>
+          <p:cNvCxnSpPr/>
+          <p:nvPr/>
+        </p:nvCxnSpPr>
+        <p:spPr>
+          <a:xfrm flipV="1">
+            <a:off x="9375530" y="2797485"/>
+            <a:ext cx="973846" cy="1352315"/>
+          </a:xfrm>
+          <a:prstGeom prst="straightConnector1">
+            <a:avLst/>
+          </a:prstGeom>
+          <a:ln>
+            <a:tailEnd type="triangle"/>
+          </a:ln>
+        </p:spPr>
+        <p:style>
+          <a:lnRef idx="1">
+            <a:schemeClr val="accent1"/>
+          </a:lnRef>
+          <a:fillRef idx="0">
+            <a:schemeClr val="accent1"/>
+          </a:fillRef>
+          <a:effectRef idx="0">
+            <a:schemeClr val="accent1"/>
+          </a:effectRef>
+          <a:fontRef idx="minor">
+            <a:schemeClr val="tx1"/>
+          </a:fontRef>
+        </p:style>
+      </p:cxnSp>
     </p:spTree>
     <p:extLst>
       <p:ext uri="{BB962C8B-B14F-4D97-AF65-F5344CB8AC3E}">

</xml_diff>